<commit_message>
updated powerpoint with optimization values
</commit_message>
<xml_diff>
--- a/ObesityRiskFactors.pptx
+++ b/ObesityRiskFactors.pptx
@@ -211,7 +211,7 @@
           <a:p>
             <a:fld id="{502849AC-9339-E34F-BA9E-F5D7A77A3746}" type="datetimeFigureOut">
               <a:rPr lang="en-US" smtClean="0"/>
-              <a:t>6/5/23</a:t>
+              <a:t>6/8/2023</a:t>
             </a:fld>
             <a:endParaRPr lang="en-US"/>
           </a:p>
@@ -1151,7 +1151,7 @@
           <a:p>
             <a:fld id="{D7FAFFF7-A8A4-7946-B6C2-8B2A49ECA073}" type="datetimeFigureOut">
               <a:rPr lang="en-US" smtClean="0"/>
-              <a:t>6/5/23</a:t>
+              <a:t>6/8/2023</a:t>
             </a:fld>
             <a:endParaRPr lang="en-US"/>
           </a:p>
@@ -1321,7 +1321,7 @@
           <a:p>
             <a:fld id="{D7FAFFF7-A8A4-7946-B6C2-8B2A49ECA073}" type="datetimeFigureOut">
               <a:rPr lang="en-US" smtClean="0"/>
-              <a:t>6/5/23</a:t>
+              <a:t>6/8/2023</a:t>
             </a:fld>
             <a:endParaRPr lang="en-US"/>
           </a:p>
@@ -1501,7 +1501,7 @@
           <a:p>
             <a:fld id="{D7FAFFF7-A8A4-7946-B6C2-8B2A49ECA073}" type="datetimeFigureOut">
               <a:rPr lang="en-US" smtClean="0"/>
-              <a:t>6/5/23</a:t>
+              <a:t>6/8/2023</a:t>
             </a:fld>
             <a:endParaRPr lang="en-US"/>
           </a:p>
@@ -1671,7 +1671,7 @@
           <a:p>
             <a:fld id="{D7FAFFF7-A8A4-7946-B6C2-8B2A49ECA073}" type="datetimeFigureOut">
               <a:rPr lang="en-US" smtClean="0"/>
-              <a:t>6/5/23</a:t>
+              <a:t>6/8/2023</a:t>
             </a:fld>
             <a:endParaRPr lang="en-US"/>
           </a:p>
@@ -1939,7 +1939,7 @@
           <a:p>
             <a:fld id="{D7FAFFF7-A8A4-7946-B6C2-8B2A49ECA073}" type="datetimeFigureOut">
               <a:rPr lang="en-US" smtClean="0"/>
-              <a:t>6/5/23</a:t>
+              <a:t>6/8/2023</a:t>
             </a:fld>
             <a:endParaRPr lang="en-US"/>
           </a:p>
@@ -2171,7 +2171,7 @@
           <a:p>
             <a:fld id="{D7FAFFF7-A8A4-7946-B6C2-8B2A49ECA073}" type="datetimeFigureOut">
               <a:rPr lang="en-US" smtClean="0"/>
-              <a:t>6/5/23</a:t>
+              <a:t>6/8/2023</a:t>
             </a:fld>
             <a:endParaRPr lang="en-US"/>
           </a:p>
@@ -2530,7 +2530,7 @@
           <a:p>
             <a:fld id="{D7FAFFF7-A8A4-7946-B6C2-8B2A49ECA073}" type="datetimeFigureOut">
               <a:rPr lang="en-US" smtClean="0"/>
-              <a:t>6/5/23</a:t>
+              <a:t>6/8/2023</a:t>
             </a:fld>
             <a:endParaRPr lang="en-US"/>
           </a:p>
@@ -2671,7 +2671,7 @@
           <a:p>
             <a:fld id="{D7FAFFF7-A8A4-7946-B6C2-8B2A49ECA073}" type="datetimeFigureOut">
               <a:rPr lang="en-US" smtClean="0"/>
-              <a:t>6/5/23</a:t>
+              <a:t>6/8/2023</a:t>
             </a:fld>
             <a:endParaRPr lang="en-US"/>
           </a:p>
@@ -2766,7 +2766,7 @@
           <a:p>
             <a:fld id="{D7FAFFF7-A8A4-7946-B6C2-8B2A49ECA073}" type="datetimeFigureOut">
               <a:rPr lang="en-US" smtClean="0"/>
-              <a:t>6/5/23</a:t>
+              <a:t>6/8/2023</a:t>
             </a:fld>
             <a:endParaRPr lang="en-US"/>
           </a:p>
@@ -3123,7 +3123,7 @@
           <a:p>
             <a:fld id="{D7FAFFF7-A8A4-7946-B6C2-8B2A49ECA073}" type="datetimeFigureOut">
               <a:rPr lang="en-US" smtClean="0"/>
-              <a:t>6/5/23</a:t>
+              <a:t>6/8/2023</a:t>
             </a:fld>
             <a:endParaRPr lang="en-US"/>
           </a:p>
@@ -3480,7 +3480,7 @@
           <a:p>
             <a:fld id="{D7FAFFF7-A8A4-7946-B6C2-8B2A49ECA073}" type="datetimeFigureOut">
               <a:rPr lang="en-US" smtClean="0"/>
-              <a:t>6/5/23</a:t>
+              <a:t>6/8/2023</a:t>
             </a:fld>
             <a:endParaRPr lang="en-US"/>
           </a:p>
@@ -3722,7 +3722,7 @@
           <a:p>
             <a:fld id="{D7FAFFF7-A8A4-7946-B6C2-8B2A49ECA073}" type="datetimeFigureOut">
               <a:rPr lang="en-US" smtClean="0"/>
-              <a:t>6/5/23</a:t>
+              <a:t>6/8/2023</a:t>
             </a:fld>
             <a:endParaRPr lang="en-US"/>
           </a:p>
@@ -4419,7 +4419,7 @@
         <p:spPr>
           <a:xfrm>
             <a:off x="4541421" y="2496893"/>
-            <a:ext cx="3109158" cy="2308324"/>
+            <a:ext cx="3109158" cy="2585323"/>
           </a:xfrm>
           <a:prstGeom prst="rect">
             <a:avLst/>
@@ -4443,7 +4443,13 @@
           <a:p>
             <a:r>
               <a:rPr lang="en-US" dirty="0"/>
-              <a:t>R-Squared Value = 0.86</a:t>
+              <a:t>Loss = 12.6256</a:t>
+            </a:r>
+          </a:p>
+          <a:p>
+            <a:r>
+              <a:rPr lang="en-US" dirty="0"/>
+              <a:t>R-Squared Value = 0.7562</a:t>
             </a:r>
           </a:p>
           <a:p>
@@ -4459,13 +4465,13 @@
             </a:r>
             <a:r>
               <a:rPr lang="en-US" dirty="0"/>
-              <a:t> = NA</a:t>
+              <a:t> = 7.2005</a:t>
             </a:r>
           </a:p>
           <a:p>
             <a:r>
               <a:rPr lang="en-US" dirty="0"/>
-              <a:t>RMSE = 14.55</a:t>
+              <a:t>RMSE = 3.553</a:t>
             </a:r>
           </a:p>
           <a:p>
@@ -4494,7 +4500,7 @@
         <p:spPr>
           <a:xfrm>
             <a:off x="8158838" y="2476507"/>
-            <a:ext cx="3109158" cy="3416320"/>
+            <a:ext cx="3109158" cy="3693319"/>
           </a:xfrm>
           <a:prstGeom prst="rect">
             <a:avLst/>
@@ -4518,7 +4524,13 @@
           <a:p>
             <a:r>
               <a:rPr lang="en-US" dirty="0"/>
-              <a:t>R-Squared Value = 0.83</a:t>
+              <a:t>Loss = 8.7319</a:t>
+            </a:r>
+          </a:p>
+          <a:p>
+            <a:r>
+              <a:rPr lang="en-US" dirty="0"/>
+              <a:t>R-Squared Value = 0.8312</a:t>
             </a:r>
           </a:p>
           <a:p>
@@ -4540,7 +4552,7 @@
           <a:p>
             <a:r>
               <a:rPr lang="en-US" dirty="0"/>
-              <a:t>RMSE = 2.96</a:t>
+              <a:t>RMSE = 2.955</a:t>
             </a:r>
           </a:p>
           <a:p>
@@ -4572,7 +4584,7 @@
         <p:spPr>
           <a:xfrm>
             <a:off x="924004" y="2476507"/>
-            <a:ext cx="3109158" cy="2031325"/>
+            <a:ext cx="3109158" cy="2308324"/>
           </a:xfrm>
           <a:prstGeom prst="rect">
             <a:avLst/>
@@ -4587,7 +4599,7 @@
           <a:p>
             <a:r>
               <a:rPr lang="en-US" dirty="0"/>
-              <a:t>Linear Regression</a:t>
+              <a:t>Linear Regression:</a:t>
             </a:r>
           </a:p>
           <a:p>
@@ -4596,7 +4608,13 @@
           <a:p>
             <a:r>
               <a:rPr lang="en-US" dirty="0"/>
-              <a:t>R-Squared Value = 0.56</a:t>
+              <a:t>Loss = 14.943</a:t>
+            </a:r>
+          </a:p>
+          <a:p>
+            <a:r>
+              <a:rPr lang="en-US" dirty="0"/>
+              <a:t>R-Squared Value = 0.743</a:t>
             </a:r>
           </a:p>
           <a:p>
@@ -4621,13 +4639,13 @@
             </a:r>
             <a:r>
               <a:rPr lang="en-US" dirty="0"/>
-              <a:t>= NA</a:t>
+              <a:t>= 7.6946</a:t>
             </a:r>
           </a:p>
           <a:p>
             <a:r>
               <a:rPr lang="en-US" dirty="0"/>
-              <a:t>RMSE = 45.42</a:t>
+              <a:t>RMSE = 3.8656</a:t>
             </a:r>
           </a:p>
           <a:p>
@@ -4727,13 +4745,13 @@
           <a:p>
             <a:r>
               <a:rPr lang="en-US" dirty="0"/>
-              <a:t>R-Squared Value = 0.83</a:t>
+              <a:t>R-Squared Value = 0.8312</a:t>
             </a:r>
           </a:p>
           <a:p>
             <a:r>
               <a:rPr lang="en-US" dirty="0"/>
-              <a:t>RMSE  = 2.96</a:t>
+              <a:t>RMSE  = 2.955</a:t>
             </a:r>
           </a:p>
           <a:p>
@@ -5398,8 +5416,45 @@
                 <a:effectLst/>
                 <a:latin typeface="-apple-system"/>
               </a:rPr>
-              <a:t>Regression analysis – neural network optimized model had a R-squared value of 0.83 and an RMSE of 2.96 with a target y variable standard deviation of 7.2. </a:t>
-            </a:r>
+              <a:t>Regression analysis – neural network optimized model had a R-squared value </a:t>
+            </a:r>
+            <a:r>
+              <a:rPr lang="en-US" b="0" i="0">
+                <a:solidFill>
+                  <a:srgbClr val="1F2328"/>
+                </a:solidFill>
+                <a:effectLst/>
+                <a:latin typeface="-apple-system"/>
+              </a:rPr>
+              <a:t>of 0.8312 </a:t>
+            </a:r>
+            <a:r>
+              <a:rPr lang="en-US" b="0" i="0" dirty="0">
+                <a:solidFill>
+                  <a:srgbClr val="1F2328"/>
+                </a:solidFill>
+                <a:effectLst/>
+                <a:latin typeface="-apple-system"/>
+              </a:rPr>
+              <a:t>and an RMSE of 2.955 with a target y variable standard deviation </a:t>
+            </a:r>
+            <a:r>
+              <a:rPr lang="en-US" b="0" i="0">
+                <a:solidFill>
+                  <a:srgbClr val="1F2328"/>
+                </a:solidFill>
+                <a:effectLst/>
+                <a:latin typeface="-apple-system"/>
+              </a:rPr>
+              <a:t>of 7.1963. </a:t>
+            </a:r>
+            <a:endParaRPr lang="en-US" b="0" i="0" dirty="0">
+              <a:solidFill>
+                <a:srgbClr val="1F2328"/>
+              </a:solidFill>
+              <a:effectLst/>
+              <a:latin typeface="-apple-system"/>
+            </a:endParaRPr>
           </a:p>
           <a:p>
             <a:r>

</xml_diff>

<commit_message>
Updated visual for prediction model
</commit_message>
<xml_diff>
--- a/ObesityRiskFactors.pptx
+++ b/ObesityRiskFactors.pptx
@@ -4874,7 +4874,7 @@
         </p:nvSpPr>
         <p:spPr>
           <a:xfrm>
-            <a:off x="2231136" y="810944"/>
+            <a:off x="2231136" y="543906"/>
             <a:ext cx="7729728" cy="1188720"/>
           </a:xfrm>
         </p:spPr>
@@ -4944,7 +4944,7 @@
         </p:blipFill>
         <p:spPr>
           <a:xfrm>
-            <a:off x="5033537" y="2243050"/>
+            <a:off x="5033537" y="2105485"/>
             <a:ext cx="4999935" cy="4531677"/>
           </a:xfrm>
           <a:prstGeom prst="rect">
@@ -5384,10 +5384,17 @@
                 <a:effectLst/>
                 <a:latin typeface="-apple-system"/>
               </a:rPr>
-              <a:t>Data included was overweight classification, physical activity, location, income level, education, gender and race.</a:t>
-            </a:r>
-          </a:p>
-          <a:p>
+              <a:t>Data included: overweight classification, physical activity, location</a:t>
+            </a:r>
+            <a:r>
+              <a:rPr lang="en-US" dirty="0">
+                <a:solidFill>
+                  <a:srgbClr val="1F2328"/>
+                </a:solidFill>
+                <a:latin typeface="-apple-system"/>
+              </a:rPr>
+              <a:t>,</a:t>
+            </a:r>
             <a:r>
               <a:rPr lang="en-US" b="0" i="0" dirty="0">
                 <a:solidFill>
@@ -5396,18 +5403,10 @@
                 <a:effectLst/>
                 <a:latin typeface="-apple-system"/>
               </a:rPr>
-              <a:t>Factors that were eliminated from the model were years in which less comprehensive data was collected and nutritional attributes (</a:t>
-            </a:r>
-            <a:r>
-              <a:rPr lang="en-US" b="0" i="0" dirty="0" err="1">
-                <a:solidFill>
-                  <a:srgbClr val="1F2328"/>
-                </a:solidFill>
-                <a:effectLst/>
-                <a:latin typeface="-apple-system"/>
-              </a:rPr>
-              <a:t>ie</a:t>
-            </a:r>
+              <a:t> income level, education, gender and race.</a:t>
+            </a:r>
+          </a:p>
+          <a:p>
             <a:r>
               <a:rPr lang="en-US" b="0" i="0" dirty="0">
                 <a:solidFill>
@@ -5416,7 +5415,7 @@
                 <a:effectLst/>
                 <a:latin typeface="-apple-system"/>
               </a:rPr>
-              <a:t>. inclusion of fruits and vegetables in daily diet). </a:t>
+              <a:t>Factors that were eliminated from the model included years in which less comprehensive data was collected and nutritional attributes (i.e. - inclusion of fruits and vegetables in daily diet). </a:t>
             </a:r>
           </a:p>
           <a:p>

</xml_diff>